<commit_message>
Changes to slides, and notebooks 1 and 2
</commit_message>
<xml_diff>
--- a/Lecture notes/3_Transformations.pptx
+++ b/Lecture notes/3_Transformations.pptx
@@ -5,7 +5,7 @@
     <p:sldMasterId id="2147483648" r:id="rId1"/>
   </p:sldMasterIdLst>
   <p:notesMasterIdLst>
-    <p:notesMasterId r:id="rId10"/>
+    <p:notesMasterId r:id="rId11"/>
   </p:notesMasterIdLst>
   <p:sldIdLst>
     <p:sldId id="270" r:id="rId2"/>
@@ -16,6 +16,7 @@
     <p:sldId id="293" r:id="rId7"/>
     <p:sldId id="294" r:id="rId8"/>
     <p:sldId id="292" r:id="rId9"/>
+    <p:sldId id="295" r:id="rId10"/>
   </p:sldIdLst>
   <p:sldSz cx="12192000" cy="6858000"/>
   <p:notesSz cx="6858000" cy="9144000"/>
@@ -114,6 +115,11 @@
       </a:defRPr>
     </a:lvl9pPr>
   </p:defaultTextStyle>
+  <p:extLst>
+    <p:ext uri="{EFAFB233-063F-42B5-8137-9DF3F51BA10A}">
+      <p15:sldGuideLst xmlns:p15="http://schemas.microsoft.com/office/powerpoint/2012/main"/>
+    </p:ext>
+  </p:extLst>
 </p:presentation>
 </file>
 
@@ -687,7 +693,44 @@
           <a:p>
             <a:r>
               <a:rPr lang="en-US" dirty="0"/>
-              <a:t>This is a method of scaling</a:t>
+              <a:t>So this is the handwritten digit zero. On the left is the original. It is a 8x8 pixel image, meaning it has a total of 64 “features”, ranging in integer values from 0 to 15. And we have now an example of the most basic data operation available to you, which is normalization.</a:t>
+            </a:r>
+          </a:p>
+          <a:p>
+            <a:endParaRPr lang="en-US" dirty="0"/>
+          </a:p>
+          <a:p>
+            <a:r>
+              <a:rPr lang="en-US" dirty="0"/>
+              <a:t>Standard scaler scales according to the mean.</a:t>
+            </a:r>
+          </a:p>
+          <a:p>
+            <a:r>
+              <a:rPr lang="en-US" dirty="0" err="1"/>
+              <a:t>MinMaxScaler</a:t>
+            </a:r>
+            <a:r>
+              <a:rPr lang="en-US" dirty="0"/>
+              <a:t> scales the data to be </a:t>
+            </a:r>
+            <a:r>
+              <a:rPr lang="en-US" dirty="0" err="1"/>
+              <a:t>inbetween</a:t>
+            </a:r>
+            <a:r>
+              <a:rPr lang="en-US" dirty="0"/>
+              <a:t> two values (in this case [0,1]).</a:t>
+            </a:r>
+          </a:p>
+          <a:p>
+            <a:r>
+              <a:rPr lang="en-US" dirty="0" err="1"/>
+              <a:t>RobustScaler</a:t>
+            </a:r>
+            <a:r>
+              <a:rPr lang="en-US" dirty="0"/>
+              <a:t> scales according to the median value, making it robust to outliers.</a:t>
             </a:r>
           </a:p>
         </p:txBody>
@@ -772,10 +815,7 @@
           <a:bodyPr/>
           <a:lstStyle/>
           <a:p>
-            <a:r>
-              <a:rPr lang="en-US" dirty="0"/>
-              <a:t>Question: if there is this </a:t>
-            </a:r>
+            <a:endParaRPr lang="en-US" dirty="0"/>
           </a:p>
         </p:txBody>
       </p:sp>
@@ -966,27 +1006,7 @@
           <a:bodyPr/>
           <a:lstStyle/>
           <a:p>
-            <a:r>
-              <a:rPr lang="en-US" dirty="0"/>
-              <a:t>Why are we bothering to do all this? We want reproducibility. Multiple fields are battling through a replication crisis right now, and it’s not unique to social sciences. Physics and computer science also have these issues. Papers published at big conferences like ICML, </a:t>
-            </a:r>
-            <a:r>
-              <a:rPr lang="en-US" dirty="0" err="1"/>
-              <a:t>Neurips</a:t>
-            </a:r>
-            <a:r>
-              <a:rPr lang="en-US" dirty="0"/>
-              <a:t>, ICLR, sometimes have questionable peer review processes.</a:t>
-            </a:r>
-          </a:p>
-          <a:p>
             <a:endParaRPr lang="en-US" dirty="0"/>
-          </a:p>
-          <a:p>
-            <a:r>
-              <a:rPr lang="en-US" dirty="0"/>
-              <a:t>I like to draw a comparison between running a formula one team. You’re the boss of a formula one team. Every single thing your drivers do in the car is monitored. Heart rate, breathing rate, location on track, speed on the straight, speed though every part of every corner, steering angle, throttle input, brake input, lateral and longitudinal G-forces. Everything is collected and compared to the driver on the other side of the garage. So if you’re driver is slow, everyone knows about it, there is nowhere to hide. And we should take this driver, and use this information to make them better, faster. And if they can’t we can just get someone else who can do the job. The driver is your code. Your code needs to be open to scrutiny so that the peer review process can function effectively. Back in the 50s and 60s, you get in the car and you just try and be quicker than everyone else over a single lap.</a:t>
-            </a:r>
           </a:p>
         </p:txBody>
       </p:sp>
@@ -1084,7 +1104,23 @@
             </a:r>
             <a:r>
               <a:rPr lang="en-US" dirty="0"/>
-              <a:t>. It is geared primarily towards Neural Networks.</a:t>
+              <a:t>. It is geared primarily towards Neural Networks. As a result the step from </a:t>
+            </a:r>
+            <a:r>
+              <a:rPr lang="en-US" dirty="0" err="1"/>
+              <a:t>sklearn</a:t>
+            </a:r>
+            <a:r>
+              <a:rPr lang="en-US" dirty="0"/>
+              <a:t> to </a:t>
+            </a:r>
+            <a:r>
+              <a:rPr lang="en-US" dirty="0" err="1"/>
+              <a:t>pytorch</a:t>
+            </a:r>
+            <a:r>
+              <a:rPr lang="en-US" dirty="0"/>
+              <a:t> can be a little challenging.</a:t>
             </a:r>
           </a:p>
         </p:txBody>
@@ -1116,6 +1152,90 @@
     <p:extLst>
       <p:ext uri="{BB962C8B-B14F-4D97-AF65-F5344CB8AC3E}">
         <p14:creationId xmlns:p14="http://schemas.microsoft.com/office/powerpoint/2010/main" val="3304215462"/>
+      </p:ext>
+    </p:extLst>
+  </p:cSld>
+  <p:clrMapOvr>
+    <a:masterClrMapping/>
+  </p:clrMapOvr>
+</p:notes>
+</file>
+
+<file path=ppt/notesSlides/notesSlide8.xml><?xml version="1.0" encoding="utf-8"?>
+<p:notes xmlns:a="http://schemas.openxmlformats.org/drawingml/2006/main" xmlns:r="http://schemas.openxmlformats.org/officeDocument/2006/relationships" xmlns:p="http://schemas.openxmlformats.org/presentationml/2006/main">
+  <p:cSld>
+    <p:spTree>
+      <p:nvGrpSpPr>
+        <p:cNvPr id="1" name=""/>
+        <p:cNvGrpSpPr/>
+        <p:nvPr/>
+      </p:nvGrpSpPr>
+      <p:grpSpPr>
+        <a:xfrm>
+          <a:off x="0" y="0"/>
+          <a:ext cx="0" cy="0"/>
+          <a:chOff x="0" y="0"/>
+          <a:chExt cx="0" cy="0"/>
+        </a:xfrm>
+      </p:grpSpPr>
+      <p:sp>
+        <p:nvSpPr>
+          <p:cNvPr id="2" name="Slide Image Placeholder 1"/>
+          <p:cNvSpPr>
+            <a:spLocks noGrp="1" noRot="1" noChangeAspect="1"/>
+          </p:cNvSpPr>
+          <p:nvPr>
+            <p:ph type="sldImg"/>
+          </p:nvPr>
+        </p:nvSpPr>
+        <p:spPr/>
+      </p:sp>
+      <p:sp>
+        <p:nvSpPr>
+          <p:cNvPr id="3" name="Notes Placeholder 2"/>
+          <p:cNvSpPr>
+            <a:spLocks noGrp="1"/>
+          </p:cNvSpPr>
+          <p:nvPr>
+            <p:ph type="body" idx="1"/>
+          </p:nvPr>
+        </p:nvSpPr>
+        <p:spPr/>
+        <p:txBody>
+          <a:bodyPr/>
+          <a:lstStyle/>
+          <a:p>
+            <a:endParaRPr lang="en-US" dirty="0"/>
+          </a:p>
+        </p:txBody>
+      </p:sp>
+      <p:sp>
+        <p:nvSpPr>
+          <p:cNvPr id="4" name="Slide Number Placeholder 3"/>
+          <p:cNvSpPr>
+            <a:spLocks noGrp="1"/>
+          </p:cNvSpPr>
+          <p:nvPr>
+            <p:ph type="sldNum" sz="quarter" idx="5"/>
+          </p:nvPr>
+        </p:nvSpPr>
+        <p:spPr/>
+        <p:txBody>
+          <a:bodyPr/>
+          <a:lstStyle/>
+          <a:p>
+            <a:fld id="{201484FD-10DA-4547-A01E-D86EDBCF772B}" type="slidenum">
+              <a:rPr lang="en-US" smtClean="0"/>
+              <a:t>9</a:t>
+            </a:fld>
+            <a:endParaRPr lang="en-US"/>
+          </a:p>
+        </p:txBody>
+      </p:sp>
+    </p:spTree>
+    <p:extLst>
+      <p:ext uri="{BB962C8B-B14F-4D97-AF65-F5344CB8AC3E}">
+        <p14:creationId xmlns:p14="http://schemas.microsoft.com/office/powerpoint/2010/main" val="1616504578"/>
       </p:ext>
     </p:extLst>
   </p:cSld>
@@ -5288,7 +5408,7 @@
               <a:rPr lang="en-GB" sz="2000" dirty="0">
                 <a:effectLst/>
               </a:rPr>
-              <a:t>The pipeline object in scikit-learn is designed to meet the aforementioned desirable properties of pipelines, so it's a good idea to use it when implementing pipelines in python.</a:t>
+              <a:t>The pipeline object in scikit-learn is designed to meet the aforementioned desirable properties of pipelines, so it's a good idea to use it when implementing models or data processing using scikit learn.</a:t>
             </a:r>
           </a:p>
           <a:p>
@@ -5730,7 +5850,7 @@
         </p:blipFill>
         <p:spPr>
           <a:xfrm>
-            <a:off x="-671610" y="1173130"/>
+            <a:off x="-675951" y="1472389"/>
             <a:ext cx="13535220" cy="4511740"/>
           </a:xfrm>
           <a:prstGeom prst="rect">
@@ -5738,6 +5858,41 @@
           </a:prstGeom>
         </p:spPr>
       </p:pic>
+      <p:sp>
+        <p:nvSpPr>
+          <p:cNvPr id="3" name="TextBox 2">
+            <a:extLst>
+              <a:ext uri="{FF2B5EF4-FFF2-40B4-BE49-F238E27FC236}">
+                <a16:creationId xmlns:a16="http://schemas.microsoft.com/office/drawing/2014/main" id="{FBC9E433-7D67-E598-6114-3B13830380C3}"/>
+              </a:ext>
+            </a:extLst>
+          </p:cNvPr>
+          <p:cNvSpPr txBox="1"/>
+          <p:nvPr/>
+        </p:nvSpPr>
+        <p:spPr>
+          <a:xfrm>
+            <a:off x="980902" y="1472389"/>
+            <a:ext cx="5520550" cy="369332"/>
+          </a:xfrm>
+          <a:prstGeom prst="rect">
+            <a:avLst/>
+          </a:prstGeom>
+          <a:noFill/>
+        </p:spPr>
+        <p:txBody>
+          <a:bodyPr wrap="none" rtlCol="0">
+            <a:spAutoFit/>
+          </a:bodyPr>
+          <a:lstStyle/>
+          <a:p>
+            <a:r>
+              <a:rPr lang="en-US" dirty="0"/>
+              <a:t>Transforming the digit “0” using various scaling methods:</a:t>
+            </a:r>
+          </a:p>
+        </p:txBody>
+      </p:sp>
     </p:spTree>
     <p:extLst>
       <p:ext uri="{BB962C8B-B14F-4D97-AF65-F5344CB8AC3E}">
@@ -5896,7 +6051,42 @@
               <a:rPr lang="en-GB" sz="2000" dirty="0">
                 <a:effectLst/>
               </a:rPr>
-              <a:t>You can define your own fit() and transform() methods.</a:t>
+              <a:t>You can define your own </a:t>
+            </a:r>
+            <a:r>
+              <a:rPr lang="en-GB" sz="2000" dirty="0">
+                <a:effectLst/>
+                <a:latin typeface="Consolas" panose="020B0609020204030204" pitchFamily="49" charset="0"/>
+                <a:cs typeface="Consolas" panose="020B0609020204030204" pitchFamily="49" charset="0"/>
+              </a:rPr>
+              <a:t>fit()</a:t>
+            </a:r>
+            <a:r>
+              <a:rPr lang="en-GB" sz="2000" dirty="0">
+                <a:effectLst/>
+                <a:cs typeface="Consolas" panose="020B0609020204030204" pitchFamily="49" charset="0"/>
+              </a:rPr>
+              <a:t> </a:t>
+            </a:r>
+            <a:r>
+              <a:rPr lang="en-GB" sz="2000" dirty="0">
+                <a:effectLst/>
+              </a:rPr>
+              <a:t>and </a:t>
+            </a:r>
+            <a:r>
+              <a:rPr lang="en-GB" sz="2000" dirty="0">
+                <a:effectLst/>
+                <a:latin typeface="Consolas" panose="020B0609020204030204" pitchFamily="49" charset="0"/>
+                <a:cs typeface="Consolas" panose="020B0609020204030204" pitchFamily="49" charset="0"/>
+              </a:rPr>
+              <a:t>transform()</a:t>
+            </a:r>
+            <a:r>
+              <a:rPr lang="en-GB" sz="2000" dirty="0">
+                <a:effectLst/>
+              </a:rPr>
+              <a:t> methods.</a:t>
             </a:r>
           </a:p>
           <a:p>
@@ -5997,7 +6187,7 @@
           <a:p>
             <a:r>
               <a:rPr lang="en-US" dirty="0"/>
-              <a:t>Reproducibility</a:t>
+              <a:t>Tangent - methodological flaws</a:t>
             </a:r>
           </a:p>
           <a:p>
@@ -6053,7 +6243,7 @@
         <p:spPr>
           <a:xfrm>
             <a:off x="503660" y="1292520"/>
-            <a:ext cx="11176000" cy="2000548"/>
+            <a:ext cx="11176000" cy="1877437"/>
           </a:xfrm>
           <a:prstGeom prst="rect">
             <a:avLst/>
@@ -6072,7 +6262,7 @@
             </a:r>
           </a:p>
           <a:p>
-            <a:endParaRPr lang="en-US" sz="3200" dirty="0"/>
+            <a:endParaRPr lang="en-US" sz="2400" dirty="0"/>
           </a:p>
           <a:p>
             <a:r>
@@ -6131,7 +6321,7 @@
           <a:p>
             <a:r>
               <a:rPr lang="en-US" dirty="0"/>
-              <a:t>Reproducibility</a:t>
+              <a:t>Tangent - methodological flaws</a:t>
             </a:r>
           </a:p>
           <a:p>
@@ -6488,7 +6678,7 @@
         <p:spPr>
           <a:xfrm>
             <a:off x="503659" y="1224167"/>
-            <a:ext cx="11176000" cy="4401205"/>
+            <a:ext cx="11176000" cy="4708981"/>
           </a:xfrm>
           <a:prstGeom prst="rect">
             <a:avLst/>
@@ -6750,15 +6940,8 @@
             </a:r>
             <a:r>
               <a:rPr lang="en-GB" sz="2000" dirty="0"/>
-              <a:t>, it is straightforward to string multiple transformations one after the other. We will see how to do this in the lab using two examples: the digits we saw, and </a:t>
-            </a:r>
-            <a:r>
-              <a:rPr lang="en-GB" sz="2000"/>
-              <a:t>some text data.</a:t>
-            </a:r>
-            <a:endParaRPr lang="en-GB" sz="2000" dirty="0">
-              <a:effectLst/>
-            </a:endParaRPr>
+              <a:t>, it is straightforward to string multiple transformations one after the other. We will see how to do this in the lab using two examples: the digits we saw, and some text data.</a:t>
+            </a:r>
           </a:p>
           <a:p>
             <a:pPr marL="342900" indent="-342900">
@@ -6769,12 +6952,178 @@
               <a:effectLst/>
             </a:endParaRPr>
           </a:p>
+          <a:p>
+            <a:pPr marL="342900" indent="-342900">
+              <a:buFont typeface="Arial" panose="020B0604020202020204" pitchFamily="34" charset="0"/>
+              <a:buChar char="•"/>
+            </a:pPr>
+            <a:r>
+              <a:rPr lang="en-GB" sz="2000" dirty="0"/>
+              <a:t>We can also chain several transformations together using the </a:t>
+            </a:r>
+            <a:r>
+              <a:rPr lang="en-GB" sz="2000" dirty="0">
+                <a:latin typeface="Consolas" panose="020B0609020204030204" pitchFamily="49" charset="0"/>
+                <a:cs typeface="Consolas" panose="020B0609020204030204" pitchFamily="49" charset="0"/>
+              </a:rPr>
+              <a:t>compose</a:t>
+            </a:r>
+            <a:r>
+              <a:rPr lang="en-GB" sz="2000" dirty="0"/>
+              <a:t> method.</a:t>
+            </a:r>
+            <a:endParaRPr lang="en-GB" sz="2000" dirty="0">
+              <a:effectLst/>
+            </a:endParaRPr>
+          </a:p>
         </p:txBody>
       </p:sp>
     </p:spTree>
     <p:extLst>
       <p:ext uri="{BB962C8B-B14F-4D97-AF65-F5344CB8AC3E}">
         <p14:creationId xmlns:p14="http://schemas.microsoft.com/office/powerpoint/2010/main" val="4273009214"/>
+      </p:ext>
+    </p:extLst>
+  </p:cSld>
+  <p:clrMapOvr>
+    <a:masterClrMapping/>
+  </p:clrMapOvr>
+</p:sld>
+</file>
+
+<file path=ppt/slides/slide9.xml><?xml version="1.0" encoding="utf-8"?>
+<p:sld xmlns:a="http://schemas.openxmlformats.org/drawingml/2006/main" xmlns:r="http://schemas.openxmlformats.org/officeDocument/2006/relationships" xmlns:p="http://schemas.openxmlformats.org/presentationml/2006/main">
+  <p:cSld>
+    <p:spTree>
+      <p:nvGrpSpPr>
+        <p:cNvPr id="1" name=""/>
+        <p:cNvGrpSpPr/>
+        <p:nvPr/>
+      </p:nvGrpSpPr>
+      <p:grpSpPr>
+        <a:xfrm>
+          <a:off x="0" y="0"/>
+          <a:ext cx="0" cy="0"/>
+          <a:chOff x="0" y="0"/>
+          <a:chExt cx="0" cy="0"/>
+        </a:xfrm>
+      </p:grpSpPr>
+      <p:sp>
+        <p:nvSpPr>
+          <p:cNvPr id="2" name="Text Placeholder 1"/>
+          <p:cNvSpPr>
+            <a:spLocks noGrp="1"/>
+          </p:cNvSpPr>
+          <p:nvPr>
+            <p:ph type="body" sz="quarter" idx="10"/>
+          </p:nvPr>
+        </p:nvSpPr>
+        <p:spPr/>
+        <p:txBody>
+          <a:bodyPr>
+            <a:normAutofit/>
+          </a:bodyPr>
+          <a:lstStyle/>
+          <a:p>
+            <a:r>
+              <a:rPr lang="en-US" dirty="0"/>
+              <a:t>Transformations and pipelines lab</a:t>
+            </a:r>
+          </a:p>
+          <a:p>
+            <a:endParaRPr lang="en-US" dirty="0"/>
+          </a:p>
+          <a:p>
+            <a:endParaRPr lang="en-US" dirty="0"/>
+          </a:p>
+        </p:txBody>
+      </p:sp>
+      <p:sp>
+        <p:nvSpPr>
+          <p:cNvPr id="3" name="TextBox 2">
+            <a:extLst>
+              <a:ext uri="{FF2B5EF4-FFF2-40B4-BE49-F238E27FC236}">
+                <a16:creationId xmlns:a16="http://schemas.microsoft.com/office/drawing/2014/main" id="{647DFCC2-FF60-925D-7D59-79058319894C}"/>
+              </a:ext>
+            </a:extLst>
+          </p:cNvPr>
+          <p:cNvSpPr txBox="1"/>
+          <p:nvPr/>
+        </p:nvSpPr>
+        <p:spPr>
+          <a:xfrm>
+            <a:off x="503659" y="1224167"/>
+            <a:ext cx="11176000" cy="1323439"/>
+          </a:xfrm>
+          <a:prstGeom prst="rect">
+            <a:avLst/>
+          </a:prstGeom>
+          <a:noFill/>
+        </p:spPr>
+        <p:txBody>
+          <a:bodyPr wrap="square" rtlCol="0">
+            <a:spAutoFit/>
+          </a:bodyPr>
+          <a:lstStyle/>
+          <a:p>
+            <a:r>
+              <a:rPr lang="en-GB" sz="2000" dirty="0">
+                <a:effectLst/>
+              </a:rPr>
+              <a:t>Using the Pipeline object, we can chain many of these transformations together with a model at the end.</a:t>
+            </a:r>
+          </a:p>
+          <a:p>
+            <a:pPr marL="342900" indent="-342900">
+              <a:buFont typeface="Arial" panose="020B0604020202020204" pitchFamily="34" charset="0"/>
+              <a:buChar char="•"/>
+            </a:pPr>
+            <a:endParaRPr lang="en-GB" sz="2000" dirty="0"/>
+          </a:p>
+          <a:p>
+            <a:pPr marL="342900" indent="-342900">
+              <a:buFont typeface="Arial" panose="020B0604020202020204" pitchFamily="34" charset="0"/>
+              <a:buChar char="•"/>
+            </a:pPr>
+            <a:endParaRPr lang="en-GB" sz="2000" dirty="0">
+              <a:effectLst/>
+            </a:endParaRPr>
+          </a:p>
+          <a:p>
+            <a:r>
+              <a:rPr lang="en-GB" sz="2000" dirty="0">
+                <a:effectLst/>
+              </a:rPr>
+              <a:t>Let’s check out the first proper lab on transformations and introduce the </a:t>
+            </a:r>
+            <a:r>
+              <a:rPr lang="en-GB" sz="2000" dirty="0">
+                <a:effectLst/>
+                <a:latin typeface="Consolas" panose="020B0609020204030204" pitchFamily="49" charset="0"/>
+                <a:cs typeface="Consolas" panose="020B0609020204030204" pitchFamily="49" charset="0"/>
+              </a:rPr>
+              <a:t>Pipeline</a:t>
+            </a:r>
+            <a:r>
+              <a:rPr lang="en-GB" sz="2000" dirty="0">
+                <a:effectLst/>
+              </a:rPr>
+              <a:t> object..</a:t>
+            </a:r>
+            <a:r>
+              <a:rPr lang="en-GB" sz="2000" dirty="0"/>
+              <a:t>.</a:t>
+            </a:r>
+            <a:endParaRPr lang="en-GB" sz="2000" dirty="0">
+              <a:effectLst/>
+            </a:endParaRPr>
+          </a:p>
+        </p:txBody>
+      </p:sp>
+    </p:spTree>
+    <p:extLst>
+      <p:ext uri="{BB962C8B-B14F-4D97-AF65-F5344CB8AC3E}">
+        <p14:creationId xmlns:p14="http://schemas.microsoft.com/office/powerpoint/2010/main" val="2133543360"/>
       </p:ext>
     </p:extLst>
   </p:cSld>

</xml_diff>